<commit_message>
- Add correlation on close
</commit_message>
<xml_diff>
--- a/docs/EDAAccionesEnergeticasYConflictos.pptx
+++ b/docs/EDAAccionesEnergeticasYConflictos.pptx
@@ -131,17 +131,6 @@
 <p188:authorLst xmlns:a="http://schemas.openxmlformats.org/drawingml/2006/main" xmlns:r="http://schemas.openxmlformats.org/officeDocument/2006/relationships" xmlns:p188="http://schemas.microsoft.com/office/powerpoint/2018/8/main">
   <p188:author id="{601BFCD6-C0D4-0A76-C64D-27600B3B8A43}" name="Pablo Pozo Vargas" initials="PP" userId="7dc91523c4f942c9" providerId="Windows Live"/>
 </p188:authorLst>
-</file>
-
-<file path=ppt/revisionInfo.xml><?xml version="1.0" encoding="utf-8"?>
-<p1510:revInfo xmlns:a="http://schemas.openxmlformats.org/drawingml/2006/main" xmlns:r="http://schemas.openxmlformats.org/officeDocument/2006/relationships" xmlns:p1510="http://schemas.microsoft.com/office/powerpoint/2015/10/main">
-  <p1510:revLst>
-    <p1510:client id="{46AE136B-E27B-0062-937B-8E31736CC31D}" v="2353" dt="2024-05-04T14:38:29.486"/>
-    <p1510:client id="{499B62FD-713E-59CC-66D8-1B97A955FE1A}" v="12" dt="2024-05-04T10:09:28.437"/>
-    <p1510:client id="{9136BF4B-ED6B-DB80-0D96-765E8F334C1F}" v="102" dt="2024-05-04T10:29:50.564"/>
-    <p1510:client id="{B7BE3AE3-D04E-03F2-6BEA-4E35AAF65879}" v="829" dt="2024-05-04T11:15:17.253"/>
-  </p1510:revLst>
-</p1510:revInfo>
 </file>
 
 <file path=ppt/comments/modernComment_100_8F6CD09A.xml><?xml version="1.0" encoding="utf-8"?>

</xml_diff>